<commit_message>
work on power BI
</commit_message>
<xml_diff>
--- a/Road_Accident_Analysis/Road_Accident_Data.pptx
+++ b/Road_Accident_Analysis/Road_Accident_Data.pptx
@@ -5,18 +5,17 @@
     <p:sldMasterId id="2147483648" r:id="rId1"/>
   </p:sldMasterIdLst>
   <p:notesMasterIdLst>
-    <p:notesMasterId r:id="rId11"/>
+    <p:notesMasterId r:id="rId10"/>
   </p:notesMasterIdLst>
   <p:sldIdLst>
     <p:sldId id="257" r:id="rId2"/>
-    <p:sldId id="256" r:id="rId3"/>
-    <p:sldId id="258" r:id="rId4"/>
-    <p:sldId id="259" r:id="rId5"/>
-    <p:sldId id="260" r:id="rId6"/>
-    <p:sldId id="261" r:id="rId7"/>
-    <p:sldId id="262" r:id="rId8"/>
-    <p:sldId id="263" r:id="rId9"/>
-    <p:sldId id="264" r:id="rId10"/>
+    <p:sldId id="258" r:id="rId3"/>
+    <p:sldId id="259" r:id="rId4"/>
+    <p:sldId id="260" r:id="rId5"/>
+    <p:sldId id="261" r:id="rId6"/>
+    <p:sldId id="262" r:id="rId7"/>
+    <p:sldId id="263" r:id="rId8"/>
+    <p:sldId id="264" r:id="rId9"/>
   </p:sldIdLst>
   <p:sldSz cx="12192000" cy="6858000"/>
   <p:notesSz cx="6858000" cy="9144000"/>
@@ -7551,91 +7550,7 @@
           <a:p>
             <a:fld id="{DC3A089C-742F-CB4F-B538-0FEF3ADCCFA6}" type="slidenum">
               <a:rPr lang="en-US" smtClean="0"/>
-              <a:t>2</a:t>
-            </a:fld>
-            <a:endParaRPr lang="en-US" dirty="0"/>
-          </a:p>
-        </p:txBody>
-      </p:sp>
-    </p:spTree>
-    <p:extLst>
-      <p:ext uri="{BB962C8B-B14F-4D97-AF65-F5344CB8AC3E}">
-        <p14:creationId xmlns:p14="http://schemas.microsoft.com/office/powerpoint/2010/main" val="3015714281"/>
-      </p:ext>
-    </p:extLst>
-  </p:cSld>
-  <p:clrMapOvr>
-    <a:masterClrMapping/>
-  </p:clrMapOvr>
-</p:notes>
-</file>
-
-<file path=ppt/notesSlides/notesSlide2.xml><?xml version="1.0" encoding="utf-8"?>
-<p:notes xmlns:a="http://schemas.openxmlformats.org/drawingml/2006/main" xmlns:r="http://schemas.openxmlformats.org/officeDocument/2006/relationships" xmlns:p="http://schemas.openxmlformats.org/presentationml/2006/main">
-  <p:cSld>
-    <p:spTree>
-      <p:nvGrpSpPr>
-        <p:cNvPr id="1" name=""/>
-        <p:cNvGrpSpPr/>
-        <p:nvPr/>
-      </p:nvGrpSpPr>
-      <p:grpSpPr>
-        <a:xfrm>
-          <a:off x="0" y="0"/>
-          <a:ext cx="0" cy="0"/>
-          <a:chOff x="0" y="0"/>
-          <a:chExt cx="0" cy="0"/>
-        </a:xfrm>
-      </p:grpSpPr>
-      <p:sp>
-        <p:nvSpPr>
-          <p:cNvPr id="2" name="Slide Image Placeholder 1"/>
-          <p:cNvSpPr>
-            <a:spLocks noGrp="1" noRot="1" noChangeAspect="1"/>
-          </p:cNvSpPr>
-          <p:nvPr>
-            <p:ph type="sldImg"/>
-          </p:nvPr>
-        </p:nvSpPr>
-        <p:spPr/>
-      </p:sp>
-      <p:sp>
-        <p:nvSpPr>
-          <p:cNvPr id="3" name="Notes Placeholder 2"/>
-          <p:cNvSpPr>
-            <a:spLocks noGrp="1"/>
-          </p:cNvSpPr>
-          <p:nvPr>
-            <p:ph type="body" idx="1"/>
-          </p:nvPr>
-        </p:nvSpPr>
-        <p:spPr/>
-        <p:txBody>
-          <a:bodyPr/>
-          <a:lstStyle/>
-          <a:p>
-            <a:endParaRPr lang="en-US" dirty="0"/>
-          </a:p>
-        </p:txBody>
-      </p:sp>
-      <p:sp>
-        <p:nvSpPr>
-          <p:cNvPr id="4" name="Slide Number Placeholder 3"/>
-          <p:cNvSpPr>
-            <a:spLocks noGrp="1"/>
-          </p:cNvSpPr>
-          <p:nvPr>
-            <p:ph type="sldNum" sz="quarter" idx="5"/>
-          </p:nvPr>
-        </p:nvSpPr>
-        <p:spPr/>
-        <p:txBody>
-          <a:bodyPr/>
-          <a:lstStyle/>
-          <a:p>
-            <a:fld id="{DC3A089C-742F-CB4F-B538-0FEF3ADCCFA6}" type="slidenum">
-              <a:rPr lang="en-US" smtClean="0"/>
-              <a:t>6</a:t>
+              <a:t>5</a:t>
             </a:fld>
             <a:endParaRPr lang="en-US"/>
           </a:p>
@@ -10960,485 +10875,6 @@
 <file path=ppt/slides/slide2.xml><?xml version="1.0" encoding="utf-8"?>
 <p:sld xmlns:a="http://schemas.openxmlformats.org/drawingml/2006/main" xmlns:r="http://schemas.openxmlformats.org/officeDocument/2006/relationships" xmlns:p="http://schemas.openxmlformats.org/presentationml/2006/main">
   <p:cSld>
-    <p:bg>
-      <p:bgPr>
-        <a:solidFill>
-          <a:schemeClr val="bg1">
-            <a:lumMod val="50000"/>
-          </a:schemeClr>
-        </a:solidFill>
-        <a:effectLst/>
-      </p:bgPr>
-    </p:bg>
-    <p:spTree>
-      <p:nvGrpSpPr>
-        <p:cNvPr id="1" name=""/>
-        <p:cNvGrpSpPr/>
-        <p:nvPr/>
-      </p:nvGrpSpPr>
-      <p:grpSpPr>
-        <a:xfrm>
-          <a:off x="0" y="0"/>
-          <a:ext cx="0" cy="0"/>
-          <a:chOff x="0" y="0"/>
-          <a:chExt cx="0" cy="0"/>
-        </a:xfrm>
-      </p:grpSpPr>
-      <p:grpSp>
-        <p:nvGrpSpPr>
-          <p:cNvPr id="23" name="Group 22">
-            <a:extLst>
-              <a:ext uri="{FF2B5EF4-FFF2-40B4-BE49-F238E27FC236}">
-                <a16:creationId xmlns:a16="http://schemas.microsoft.com/office/drawing/2014/main" id="{616941B0-EA0E-4CD1-12F4-6EE5A1A502A6}"/>
-              </a:ext>
-            </a:extLst>
-          </p:cNvPr>
-          <p:cNvGrpSpPr/>
-          <p:nvPr/>
-        </p:nvGrpSpPr>
-        <p:grpSpPr>
-          <a:xfrm>
-            <a:off x="72080" y="37997"/>
-            <a:ext cx="12047839" cy="6782006"/>
-            <a:chOff x="0" y="113991"/>
-            <a:chExt cx="12047839" cy="6782006"/>
-          </a:xfrm>
-        </p:grpSpPr>
-        <p:grpSp>
-          <p:nvGrpSpPr>
-            <p:cNvPr id="19" name="Group 18">
-              <a:extLst>
-                <a:ext uri="{FF2B5EF4-FFF2-40B4-BE49-F238E27FC236}">
-                  <a16:creationId xmlns:a16="http://schemas.microsoft.com/office/drawing/2014/main" id="{D813796C-0655-CFD2-CDD1-C0370CE475E1}"/>
-                </a:ext>
-              </a:extLst>
-            </p:cNvPr>
-            <p:cNvGrpSpPr/>
-            <p:nvPr/>
-          </p:nvGrpSpPr>
-          <p:grpSpPr>
-            <a:xfrm>
-              <a:off x="0" y="113991"/>
-              <a:ext cx="12047839" cy="6782006"/>
-              <a:chOff x="144164" y="148281"/>
-              <a:chExt cx="12047839" cy="6782006"/>
-            </a:xfrm>
-          </p:grpSpPr>
-          <p:sp>
-            <p:nvSpPr>
-              <p:cNvPr id="5" name="Rounded Rectangle 4">
-                <a:extLst>
-                  <a:ext uri="{FF2B5EF4-FFF2-40B4-BE49-F238E27FC236}">
-                    <a16:creationId xmlns:a16="http://schemas.microsoft.com/office/drawing/2014/main" id="{B7D3B884-B2B4-1167-D6AE-BBD14B0D5EE6}"/>
-                  </a:ext>
-                </a:extLst>
-              </p:cNvPr>
-              <p:cNvSpPr/>
-              <p:nvPr/>
-            </p:nvSpPr>
-            <p:spPr>
-              <a:xfrm>
-                <a:off x="144164" y="148281"/>
-                <a:ext cx="3019167" cy="914400"/>
-              </a:xfrm>
-              <a:prstGeom prst="roundRect">
-                <a:avLst/>
-              </a:prstGeom>
-            </p:spPr>
-            <p:style>
-              <a:lnRef idx="2">
-                <a:schemeClr val="dk1"/>
-              </a:lnRef>
-              <a:fillRef idx="1">
-                <a:schemeClr val="lt1"/>
-              </a:fillRef>
-              <a:effectRef idx="0">
-                <a:schemeClr val="dk1"/>
-              </a:effectRef>
-              <a:fontRef idx="minor">
-                <a:schemeClr val="dk1"/>
-              </a:fontRef>
-            </p:style>
-            <p:txBody>
-              <a:bodyPr rtlCol="0" anchor="ctr"/>
-              <a:lstStyle/>
-              <a:p>
-                <a:pPr algn="ctr"/>
-                <a:endParaRPr lang="en-US" dirty="0"/>
-              </a:p>
-            </p:txBody>
-          </p:sp>
-          <p:sp>
-            <p:nvSpPr>
-              <p:cNvPr id="6" name="Rounded Rectangle 5">
-                <a:extLst>
-                  <a:ext uri="{FF2B5EF4-FFF2-40B4-BE49-F238E27FC236}">
-                    <a16:creationId xmlns:a16="http://schemas.microsoft.com/office/drawing/2014/main" id="{8B049A4F-3686-C5B5-079A-6F67B8E74FBC}"/>
-                  </a:ext>
-                </a:extLst>
-              </p:cNvPr>
-              <p:cNvSpPr/>
-              <p:nvPr/>
-            </p:nvSpPr>
-            <p:spPr>
-              <a:xfrm>
-                <a:off x="3299253" y="220568"/>
-                <a:ext cx="8637373" cy="625252"/>
-              </a:xfrm>
-              <a:prstGeom prst="roundRect">
-                <a:avLst/>
-              </a:prstGeom>
-              <a:ln/>
-            </p:spPr>
-            <p:style>
-              <a:lnRef idx="2">
-                <a:schemeClr val="dk1"/>
-              </a:lnRef>
-              <a:fillRef idx="1">
-                <a:schemeClr val="lt1"/>
-              </a:fillRef>
-              <a:effectRef idx="0">
-                <a:schemeClr val="dk1"/>
-              </a:effectRef>
-              <a:fontRef idx="minor">
-                <a:schemeClr val="dk1"/>
-              </a:fontRef>
-            </p:style>
-            <p:txBody>
-              <a:bodyPr rtlCol="0" anchor="ctr"/>
-              <a:lstStyle/>
-              <a:p>
-                <a:pPr algn="ctr"/>
-                <a:endParaRPr lang="en-US" dirty="0"/>
-              </a:p>
-            </p:txBody>
-          </p:sp>
-          <p:sp>
-            <p:nvSpPr>
-              <p:cNvPr id="10" name="Rounded Rectangle 9">
-                <a:extLst>
-                  <a:ext uri="{FF2B5EF4-FFF2-40B4-BE49-F238E27FC236}">
-                    <a16:creationId xmlns:a16="http://schemas.microsoft.com/office/drawing/2014/main" id="{C68B305E-FFB2-0CFF-D1DA-1D60DC67D1D3}"/>
-                  </a:ext>
-                </a:extLst>
-              </p:cNvPr>
-              <p:cNvSpPr/>
-              <p:nvPr/>
-            </p:nvSpPr>
-            <p:spPr>
-              <a:xfrm>
-                <a:off x="3929449" y="940350"/>
-                <a:ext cx="4349580" cy="2945850"/>
-              </a:xfrm>
-              <a:prstGeom prst="roundRect">
-                <a:avLst/>
-              </a:prstGeom>
-            </p:spPr>
-            <p:style>
-              <a:lnRef idx="2">
-                <a:schemeClr val="dk1"/>
-              </a:lnRef>
-              <a:fillRef idx="1">
-                <a:schemeClr val="lt1"/>
-              </a:fillRef>
-              <a:effectRef idx="0">
-                <a:schemeClr val="dk1"/>
-              </a:effectRef>
-              <a:fontRef idx="minor">
-                <a:schemeClr val="dk1"/>
-              </a:fontRef>
-            </p:style>
-            <p:txBody>
-              <a:bodyPr rtlCol="0" anchor="ctr"/>
-              <a:lstStyle/>
-              <a:p>
-                <a:pPr algn="ctr"/>
-                <a:endParaRPr lang="en-US" dirty="0"/>
-              </a:p>
-            </p:txBody>
-          </p:sp>
-          <p:sp>
-            <p:nvSpPr>
-              <p:cNvPr id="11" name="Rounded Rectangle 10">
-                <a:extLst>
-                  <a:ext uri="{FF2B5EF4-FFF2-40B4-BE49-F238E27FC236}">
-                    <a16:creationId xmlns:a16="http://schemas.microsoft.com/office/drawing/2014/main" id="{14C32E62-3E28-016E-C795-5EF6B43B12C3}"/>
-                  </a:ext>
-                </a:extLst>
-              </p:cNvPr>
-              <p:cNvSpPr/>
-              <p:nvPr/>
-            </p:nvSpPr>
-            <p:spPr>
-              <a:xfrm>
-                <a:off x="8377885" y="1084924"/>
-                <a:ext cx="3814118" cy="2656702"/>
-              </a:xfrm>
-              <a:prstGeom prst="roundRect">
-                <a:avLst/>
-              </a:prstGeom>
-            </p:spPr>
-            <p:style>
-              <a:lnRef idx="2">
-                <a:schemeClr val="dk1"/>
-              </a:lnRef>
-              <a:fillRef idx="1">
-                <a:schemeClr val="lt1"/>
-              </a:fillRef>
-              <a:effectRef idx="0">
-                <a:schemeClr val="dk1"/>
-              </a:effectRef>
-              <a:fontRef idx="minor">
-                <a:schemeClr val="dk1"/>
-              </a:fontRef>
-            </p:style>
-            <p:txBody>
-              <a:bodyPr rtlCol="0" anchor="ctr"/>
-              <a:lstStyle/>
-              <a:p>
-                <a:pPr algn="ctr"/>
-                <a:endParaRPr lang="en-US" dirty="0"/>
-              </a:p>
-            </p:txBody>
-          </p:sp>
-          <p:sp>
-            <p:nvSpPr>
-              <p:cNvPr id="13" name="Rounded Rectangle 12">
-                <a:extLst>
-                  <a:ext uri="{FF2B5EF4-FFF2-40B4-BE49-F238E27FC236}">
-                    <a16:creationId xmlns:a16="http://schemas.microsoft.com/office/drawing/2014/main" id="{6D0DDCBD-3D60-1005-5CE7-9C4BF51523B3}"/>
-                  </a:ext>
-                </a:extLst>
-              </p:cNvPr>
-              <p:cNvSpPr/>
-              <p:nvPr/>
-            </p:nvSpPr>
-            <p:spPr>
-              <a:xfrm>
-                <a:off x="160641" y="1251741"/>
-                <a:ext cx="3669953" cy="2656702"/>
-              </a:xfrm>
-              <a:prstGeom prst="roundRect">
-                <a:avLst/>
-              </a:prstGeom>
-            </p:spPr>
-            <p:style>
-              <a:lnRef idx="2">
-                <a:schemeClr val="dk1"/>
-              </a:lnRef>
-              <a:fillRef idx="1">
-                <a:schemeClr val="lt1"/>
-              </a:fillRef>
-              <a:effectRef idx="0">
-                <a:schemeClr val="dk1"/>
-              </a:effectRef>
-              <a:fontRef idx="minor">
-                <a:schemeClr val="dk1"/>
-              </a:fontRef>
-            </p:style>
-            <p:txBody>
-              <a:bodyPr rtlCol="0" anchor="ctr"/>
-              <a:lstStyle/>
-              <a:p>
-                <a:pPr algn="ctr"/>
-                <a:endParaRPr lang="en-US" dirty="0"/>
-              </a:p>
-            </p:txBody>
-          </p:sp>
-          <p:sp>
-            <p:nvSpPr>
-              <p:cNvPr id="14" name="Rounded Rectangle 13">
-                <a:extLst>
-                  <a:ext uri="{FF2B5EF4-FFF2-40B4-BE49-F238E27FC236}">
-                    <a16:creationId xmlns:a16="http://schemas.microsoft.com/office/drawing/2014/main" id="{C501FA72-EE23-374D-CD08-3C1514F720EF}"/>
-                  </a:ext>
-                </a:extLst>
-              </p:cNvPr>
-              <p:cNvSpPr/>
-              <p:nvPr/>
-            </p:nvSpPr>
-            <p:spPr>
-              <a:xfrm>
-                <a:off x="144164" y="3984437"/>
-                <a:ext cx="3155089" cy="2869856"/>
-              </a:xfrm>
-              <a:prstGeom prst="roundRect">
-                <a:avLst/>
-              </a:prstGeom>
-            </p:spPr>
-            <p:style>
-              <a:lnRef idx="2">
-                <a:schemeClr val="dk1"/>
-              </a:lnRef>
-              <a:fillRef idx="1">
-                <a:schemeClr val="lt1"/>
-              </a:fillRef>
-              <a:effectRef idx="0">
-                <a:schemeClr val="dk1"/>
-              </a:effectRef>
-              <a:fontRef idx="minor">
-                <a:schemeClr val="dk1"/>
-              </a:fontRef>
-            </p:style>
-            <p:txBody>
-              <a:bodyPr rtlCol="0" anchor="ctr"/>
-              <a:lstStyle/>
-              <a:p>
-                <a:pPr algn="ctr"/>
-                <a:endParaRPr lang="en-US" dirty="0"/>
-              </a:p>
-            </p:txBody>
-          </p:sp>
-          <p:sp>
-            <p:nvSpPr>
-              <p:cNvPr id="16" name="Rounded Rectangle 15">
-                <a:extLst>
-                  <a:ext uri="{FF2B5EF4-FFF2-40B4-BE49-F238E27FC236}">
-                    <a16:creationId xmlns:a16="http://schemas.microsoft.com/office/drawing/2014/main" id="{753D2478-48E0-DD82-5BE8-A9FECDD58D3D}"/>
-                  </a:ext>
-                </a:extLst>
-              </p:cNvPr>
-              <p:cNvSpPr/>
-              <p:nvPr/>
-            </p:nvSpPr>
-            <p:spPr>
-              <a:xfrm>
-                <a:off x="3398108" y="3984437"/>
-                <a:ext cx="3155089" cy="2945850"/>
-              </a:xfrm>
-              <a:prstGeom prst="roundRect">
-                <a:avLst/>
-              </a:prstGeom>
-            </p:spPr>
-            <p:style>
-              <a:lnRef idx="2">
-                <a:schemeClr val="dk1"/>
-              </a:lnRef>
-              <a:fillRef idx="1">
-                <a:schemeClr val="lt1"/>
-              </a:fillRef>
-              <a:effectRef idx="0">
-                <a:schemeClr val="dk1"/>
-              </a:effectRef>
-              <a:fontRef idx="minor">
-                <a:schemeClr val="dk1"/>
-              </a:fontRef>
-            </p:style>
-            <p:txBody>
-              <a:bodyPr rtlCol="0" anchor="ctr"/>
-              <a:lstStyle/>
-              <a:p>
-                <a:pPr algn="ctr"/>
-                <a:endParaRPr lang="en-US" dirty="0"/>
-              </a:p>
-            </p:txBody>
-          </p:sp>
-        </p:grpSp>
-        <p:sp>
-          <p:nvSpPr>
-            <p:cNvPr id="21" name="Rounded Rectangle 20">
-              <a:extLst>
-                <a:ext uri="{FF2B5EF4-FFF2-40B4-BE49-F238E27FC236}">
-                  <a16:creationId xmlns:a16="http://schemas.microsoft.com/office/drawing/2014/main" id="{A0EC3765-17BD-EF14-0B06-38B7AE3A46D4}"/>
-                </a:ext>
-              </a:extLst>
-            </p:cNvPr>
-            <p:cNvSpPr/>
-            <p:nvPr/>
-          </p:nvSpPr>
-          <p:spPr>
-            <a:xfrm>
-              <a:off x="6507888" y="3912150"/>
-              <a:ext cx="3155089" cy="2945850"/>
-            </a:xfrm>
-            <a:prstGeom prst="roundRect">
-              <a:avLst/>
-            </a:prstGeom>
-          </p:spPr>
-          <p:style>
-            <a:lnRef idx="2">
-              <a:schemeClr val="dk1"/>
-            </a:lnRef>
-            <a:fillRef idx="1">
-              <a:schemeClr val="lt1"/>
-            </a:fillRef>
-            <a:effectRef idx="0">
-              <a:schemeClr val="dk1"/>
-            </a:effectRef>
-            <a:fontRef idx="minor">
-              <a:schemeClr val="dk1"/>
-            </a:fontRef>
-          </p:style>
-          <p:txBody>
-            <a:bodyPr rtlCol="0" anchor="ctr"/>
-            <a:lstStyle/>
-            <a:p>
-              <a:pPr algn="ctr"/>
-              <a:endParaRPr lang="en-US" dirty="0"/>
-            </a:p>
-          </p:txBody>
-        </p:sp>
-        <p:sp>
-          <p:nvSpPr>
-            <p:cNvPr id="22" name="Rounded Rectangle 21">
-              <a:extLst>
-                <a:ext uri="{FF2B5EF4-FFF2-40B4-BE49-F238E27FC236}">
-                  <a16:creationId xmlns:a16="http://schemas.microsoft.com/office/drawing/2014/main" id="{3B940B27-3865-CF59-960B-940DC5B3053D}"/>
-                </a:ext>
-              </a:extLst>
-            </p:cNvPr>
-            <p:cNvSpPr/>
-            <p:nvPr/>
-          </p:nvSpPr>
-          <p:spPr>
-            <a:xfrm>
-              <a:off x="9761832" y="3874153"/>
-              <a:ext cx="2286007" cy="2869856"/>
-            </a:xfrm>
-            <a:prstGeom prst="roundRect">
-              <a:avLst/>
-            </a:prstGeom>
-          </p:spPr>
-          <p:style>
-            <a:lnRef idx="2">
-              <a:schemeClr val="dk1"/>
-            </a:lnRef>
-            <a:fillRef idx="1">
-              <a:schemeClr val="lt1"/>
-            </a:fillRef>
-            <a:effectRef idx="0">
-              <a:schemeClr val="dk1"/>
-            </a:effectRef>
-            <a:fontRef idx="minor">
-              <a:schemeClr val="dk1"/>
-            </a:fontRef>
-          </p:style>
-          <p:txBody>
-            <a:bodyPr rtlCol="0" anchor="ctr"/>
-            <a:lstStyle/>
-            <a:p>
-              <a:pPr algn="ctr"/>
-              <a:endParaRPr lang="en-US" dirty="0"/>
-            </a:p>
-          </p:txBody>
-        </p:sp>
-      </p:grpSp>
-    </p:spTree>
-    <p:extLst>
-      <p:ext uri="{BB962C8B-B14F-4D97-AF65-F5344CB8AC3E}">
-        <p14:creationId xmlns:p14="http://schemas.microsoft.com/office/powerpoint/2010/main" val="2824827229"/>
-      </p:ext>
-    </p:extLst>
-  </p:cSld>
-  <p:clrMapOvr>
-    <a:masterClrMapping/>
-  </p:clrMapOvr>
-</p:sld>
-</file>
-
-<file path=ppt/slides/slide3.xml><?xml version="1.0" encoding="utf-8"?>
-<p:sld xmlns:a="http://schemas.openxmlformats.org/drawingml/2006/main" xmlns:r="http://schemas.openxmlformats.org/officeDocument/2006/relationships" xmlns:p="http://schemas.openxmlformats.org/presentationml/2006/main">
-  <p:cSld>
     <p:spTree>
       <p:nvGrpSpPr>
         <p:cNvPr id="1" name=""/>
@@ -11510,7 +10946,7 @@
         </p:nvSpPr>
         <p:spPr>
           <a:xfrm>
-            <a:off x="6544963" y="1777206"/>
+            <a:off x="6483179" y="1690688"/>
             <a:ext cx="5181600" cy="4524374"/>
           </a:xfrm>
         </p:spPr>
@@ -11628,7 +11064,7 @@
 </p:sld>
 </file>
 
-<file path=ppt/slides/slide4.xml><?xml version="1.0" encoding="utf-8"?>
+<file path=ppt/slides/slide3.xml><?xml version="1.0" encoding="utf-8"?>
 <p:sld xmlns:a="http://schemas.openxmlformats.org/drawingml/2006/main" xmlns:r="http://schemas.openxmlformats.org/officeDocument/2006/relationships" xmlns:p="http://schemas.openxmlformats.org/presentationml/2006/main">
   <p:cSld>
     <p:spTree>
@@ -11789,7 +11225,7 @@
 </p:sld>
 </file>
 
-<file path=ppt/slides/slide5.xml><?xml version="1.0" encoding="utf-8"?>
+<file path=ppt/slides/slide4.xml><?xml version="1.0" encoding="utf-8"?>
 <p:sld xmlns:a="http://schemas.openxmlformats.org/drawingml/2006/main" xmlns:r="http://schemas.openxmlformats.org/officeDocument/2006/relationships" xmlns:p="http://schemas.openxmlformats.org/presentationml/2006/main">
   <p:cSld>
     <p:spTree>
@@ -11981,7 +11417,7 @@
 </p:sld>
 </file>
 
-<file path=ppt/slides/slide6.xml><?xml version="1.0" encoding="utf-8"?>
+<file path=ppt/slides/slide5.xml><?xml version="1.0" encoding="utf-8"?>
 <p:sld xmlns:a="http://schemas.openxmlformats.org/drawingml/2006/main" xmlns:r="http://schemas.openxmlformats.org/officeDocument/2006/relationships" xmlns:p="http://schemas.openxmlformats.org/presentationml/2006/main">
   <p:cSld>
     <p:spTree>
@@ -12077,7 +11513,7 @@
             <a:pPr algn="ctr"/>
             <a:r>
               <a:rPr lang="en-US" sz="2400" dirty="0"/>
-              <a:t>While, “darkness lighting unknown” has the least number of casualties in road accident with 3,829 and affected vehicles with 5,085.</a:t>
+              <a:t>While “darkness lighting unknown” has the least number of casualties in road accident with 3,829 and affected vehicles with 5,085.</a:t>
             </a:r>
           </a:p>
         </p:txBody>
@@ -12126,7 +11562,7 @@
 </p:sld>
 </file>
 
-<file path=ppt/slides/slide7.xml><?xml version="1.0" encoding="utf-8"?>
+<file path=ppt/slides/slide6.xml><?xml version="1.0" encoding="utf-8"?>
 <p:sld xmlns:a="http://schemas.openxmlformats.org/drawingml/2006/main" xmlns:r="http://schemas.openxmlformats.org/officeDocument/2006/relationships" xmlns:p="http://schemas.openxmlformats.org/presentationml/2006/main">
   <p:cSld>
     <p:spTree>
@@ -12193,9 +11629,32 @@
         </p:nvSpPr>
         <p:spPr/>
         <p:txBody>
-          <a:bodyPr/>
+          <a:bodyPr>
+            <a:normAutofit/>
+          </a:bodyPr>
           <a:lstStyle/>
           <a:p>
+            <a:r>
+              <a:rPr lang="en-US" dirty="0">
+                <a:latin typeface="Times New Roman" panose="02020603050405020304" pitchFamily="18" charset="0"/>
+                <a:cs typeface="Times New Roman" panose="02020603050405020304" pitchFamily="18" charset="0"/>
+              </a:rPr>
+              <a:t>From the data, Urban areas has more casualty than Rural areas and slight accident occurred most in both locations. </a:t>
+            </a:r>
+          </a:p>
+          <a:p>
+            <a:pPr marL="0" indent="0">
+              <a:buNone/>
+            </a:pPr>
+            <a:endParaRPr lang="en-US" dirty="0">
+              <a:latin typeface="Times New Roman" panose="02020603050405020304" pitchFamily="18" charset="0"/>
+              <a:cs typeface="Times New Roman" panose="02020603050405020304" pitchFamily="18" charset="0"/>
+            </a:endParaRPr>
+          </a:p>
+          <a:p>
+            <a:pPr marL="0" indent="0">
+              <a:buNone/>
+            </a:pPr>
             <a:endParaRPr lang="en-US" dirty="0"/>
           </a:p>
         </p:txBody>
@@ -12244,7 +11703,7 @@
 </p:sld>
 </file>
 
-<file path=ppt/slides/slide8.xml><?xml version="1.0" encoding="utf-8"?>
+<file path=ppt/slides/slide7.xml><?xml version="1.0" encoding="utf-8"?>
 <p:sld xmlns:a="http://schemas.openxmlformats.org/drawingml/2006/main" xmlns:r="http://schemas.openxmlformats.org/officeDocument/2006/relationships" xmlns:p="http://schemas.openxmlformats.org/presentationml/2006/main">
   <p:cSld>
     <p:spTree>
@@ -12282,7 +11741,14 @@
           <a:bodyPr/>
           <a:lstStyle/>
           <a:p>
-            <a:endParaRPr lang="en-US"/>
+            <a:pPr algn="ctr"/>
+            <a:r>
+              <a:rPr lang="en-US" b="1" dirty="0">
+                <a:latin typeface="Times New Roman" panose="02020603050405020304" pitchFamily="18" charset="0"/>
+                <a:cs typeface="Times New Roman" panose="02020603050405020304" pitchFamily="18" charset="0"/>
+              </a:rPr>
+              <a:t>Percentage of Casualty by Road Type</a:t>
+            </a:r>
           </a:p>
         </p:txBody>
       </p:sp>
@@ -12307,7 +11773,16 @@
           <a:bodyPr/>
           <a:lstStyle/>
           <a:p>
-            <a:endParaRPr lang="en-US"/>
+            <a:r>
+              <a:rPr lang="en-US" dirty="0"/>
+              <a:t>74% of casualties on Single Carriage-way, making it the highest % of accident occurred on road type in 2021 &amp; 2022.</a:t>
+            </a:r>
+          </a:p>
+          <a:p>
+            <a:r>
+              <a:rPr lang="en-US" dirty="0"/>
+              <a:t>Dual carriage-way has the least casualty by road type with 1% casualty.</a:t>
+            </a:r>
           </a:p>
         </p:txBody>
       </p:sp>
@@ -12355,7 +11830,7 @@
 </p:sld>
 </file>
 
-<file path=ppt/slides/slide9.xml><?xml version="1.0" encoding="utf-8"?>
+<file path=ppt/slides/slide8.xml><?xml version="1.0" encoding="utf-8"?>
 <p:sld xmlns:a="http://schemas.openxmlformats.org/drawingml/2006/main" xmlns:r="http://schemas.openxmlformats.org/officeDocument/2006/relationships" xmlns:p="http://schemas.openxmlformats.org/presentationml/2006/main">
   <p:cSld>
     <p:spTree>
@@ -12393,7 +11868,13 @@
           <a:bodyPr/>
           <a:lstStyle/>
           <a:p>
-            <a:endParaRPr lang="en-US"/>
+            <a:r>
+              <a:rPr lang="en-US" b="1" dirty="0">
+                <a:latin typeface="Times New Roman" panose="02020603050405020304" pitchFamily="18" charset="0"/>
+                <a:cs typeface="Times New Roman" panose="02020603050405020304" pitchFamily="18" charset="0"/>
+              </a:rPr>
+              <a:t>Percentage of Casualty by Road Severity</a:t>
+            </a:r>
           </a:p>
         </p:txBody>
       </p:sp>
@@ -12418,7 +11899,28 @@
           <a:bodyPr/>
           <a:lstStyle/>
           <a:p>
-            <a:endParaRPr lang="en-US"/>
+            <a:r>
+              <a:rPr lang="en-US" dirty="0"/>
+              <a:t>84% of casualty in slight accident occurred in 2021 and 2022.</a:t>
+            </a:r>
+          </a:p>
+          <a:p>
+            <a:r>
+              <a:rPr lang="en-US" dirty="0"/>
+              <a:t>14% of casualty in serious accident occurred in 2021 and 2022.</a:t>
+            </a:r>
+          </a:p>
+          <a:p>
+            <a:r>
+              <a:rPr lang="en-US" dirty="0"/>
+              <a:t>2% of casualty in fatal accident occurred in 2021 and 2022.</a:t>
+            </a:r>
+          </a:p>
+          <a:p>
+            <a:endParaRPr lang="en-US" dirty="0"/>
+          </a:p>
+          <a:p>
+            <a:endParaRPr lang="en-US" dirty="0"/>
           </a:p>
         </p:txBody>
       </p:sp>

</xml_diff>